<commit_message>
Added camara de maduracion pictures
</commit_message>
<xml_diff>
--- a/assets/img/CAVA MADURADORA DE QUESOS.pptx
+++ b/assets/img/CAVA MADURADORA DE QUESOS.pptx
@@ -104,7 +104,52 @@
       </a:defRPr>
     </a:lvl9pPr>
   </p:defaultTextStyle>
+  <p:extLst>
+    <p:ext uri="{EFAFB233-063F-42B5-8137-9DF3F51BA10A}">
+      <p15:sldGuideLst xmlns:p15="http://schemas.microsoft.com/office/powerpoint/2012/main">
+        <p15:guide id="1" orient="horz" pos="2160">
+          <p15:clr>
+            <a:srgbClr val="A4A3A4"/>
+          </p15:clr>
+        </p15:guide>
+        <p15:guide id="2" pos="2880">
+          <p15:clr>
+            <a:srgbClr val="A4A3A4"/>
+          </p15:clr>
+        </p15:guide>
+      </p15:sldGuideLst>
+    </p:ext>
+  </p:extLst>
 </p:presentation>
+</file>
+
+<file path=ppt/changesInfos/changesInfo1.xml><?xml version="1.0" encoding="utf-8"?>
+<pc:chgInfo xmlns:a="http://schemas.openxmlformats.org/drawingml/2006/main" xmlns:r="http://schemas.openxmlformats.org/officeDocument/2006/relationships" xmlns:ac="http://schemas.microsoft.com/office/drawing/2013/main/command" xmlns:pc="http://schemas.microsoft.com/office/powerpoint/2013/main/command">
+  <pc:docChgLst>
+    <pc:chgData name="Afrael Ortiz" userId="6c5b6769-b7e2-484a-9eb5-5420c271da9d" providerId="ADAL" clId="{C8136C5A-A29A-024B-98D4-824EE3E90CCC}"/>
+    <pc:docChg chg="custSel modSld">
+      <pc:chgData name="Afrael Ortiz" userId="6c5b6769-b7e2-484a-9eb5-5420c271da9d" providerId="ADAL" clId="{C8136C5A-A29A-024B-98D4-824EE3E90CCC}" dt="2021-09-04T23:14:43.403" v="0" actId="313"/>
+      <pc:docMkLst>
+        <pc:docMk/>
+      </pc:docMkLst>
+      <pc:sldChg chg="modSp mod">
+        <pc:chgData name="Afrael Ortiz" userId="6c5b6769-b7e2-484a-9eb5-5420c271da9d" providerId="ADAL" clId="{C8136C5A-A29A-024B-98D4-824EE3E90CCC}" dt="2021-09-04T23:14:43.403" v="0" actId="313"/>
+        <pc:sldMkLst>
+          <pc:docMk/>
+          <pc:sldMk cId="790690305" sldId="266"/>
+        </pc:sldMkLst>
+        <pc:spChg chg="mod">
+          <ac:chgData name="Afrael Ortiz" userId="6c5b6769-b7e2-484a-9eb5-5420c271da9d" providerId="ADAL" clId="{C8136C5A-A29A-024B-98D4-824EE3E90CCC}" dt="2021-09-04T23:14:43.403" v="0" actId="313"/>
+          <ac:spMkLst>
+            <pc:docMk/>
+            <pc:sldMk cId="790690305" sldId="266"/>
+            <ac:spMk id="15" creationId="{00000000-0000-0000-0000-000000000000}"/>
+          </ac:spMkLst>
+        </pc:spChg>
+      </pc:sldChg>
+    </pc:docChg>
+  </pc:docChgLst>
+</pc:chgInfo>
 </file>
 
 <file path=ppt/slideLayouts/slideLayout1.xml><?xml version="1.0" encoding="utf-8"?>
@@ -145,7 +190,7 @@
           <a:lstStyle/>
           <a:p>
             <a:r>
-              <a:rPr lang="es-ES" smtClean="0"/>
+              <a:rPr lang="es-ES"/>
               <a:t>Haga clic para modificar el estilo de título del patrón</a:t>
             </a:r>
             <a:endParaRPr lang="es-US"/>
@@ -264,7 +309,7 @@
           </a:lstStyle>
           <a:p>
             <a:r>
-              <a:rPr lang="es-ES" smtClean="0"/>
+              <a:rPr lang="es-ES"/>
               <a:t>Haga clic para modificar el estilo de subtítulo del patrón</a:t>
             </a:r>
             <a:endParaRPr lang="es-US"/>
@@ -288,7 +333,7 @@
           <a:p>
             <a:fld id="{72CBDC4D-2825-4B29-BDD6-C9A7F787A255}" type="datetimeFigureOut">
               <a:rPr lang="es-US" smtClean="0"/>
-              <a:t>7/19/2021</a:t>
+              <a:t>9/4/21</a:t>
             </a:fld>
             <a:endParaRPr lang="es-US"/>
           </a:p>
@@ -330,7 +375,7 @@
           <a:p>
             <a:fld id="{A6DE7BE1-8185-444A-AE5E-6A3DF189B9C2}" type="slidenum">
               <a:rPr lang="es-US" smtClean="0"/>
-              <a:t>‹Nº›</a:t>
+              <a:t>‹#›</a:t>
             </a:fld>
             <a:endParaRPr lang="es-US"/>
           </a:p>
@@ -382,7 +427,7 @@
           <a:lstStyle/>
           <a:p>
             <a:r>
-              <a:rPr lang="es-ES" smtClean="0"/>
+              <a:rPr lang="es-ES"/>
               <a:t>Haga clic para modificar el estilo de título del patrón</a:t>
             </a:r>
             <a:endParaRPr lang="es-US"/>
@@ -406,35 +451,35 @@
           <a:p>
             <a:pPr lvl="0"/>
             <a:r>
-              <a:rPr lang="es-ES" smtClean="0"/>
+              <a:rPr lang="es-ES"/>
               <a:t>Haga clic para modificar el estilo de texto del patrón</a:t>
             </a:r>
           </a:p>
           <a:p>
             <a:pPr lvl="1"/>
             <a:r>
-              <a:rPr lang="es-ES" smtClean="0"/>
+              <a:rPr lang="es-ES"/>
               <a:t>Segundo nivel</a:t>
             </a:r>
           </a:p>
           <a:p>
             <a:pPr lvl="2"/>
             <a:r>
-              <a:rPr lang="es-ES" smtClean="0"/>
+              <a:rPr lang="es-ES"/>
               <a:t>Tercer nivel</a:t>
             </a:r>
           </a:p>
           <a:p>
             <a:pPr lvl="3"/>
             <a:r>
-              <a:rPr lang="es-ES" smtClean="0"/>
+              <a:rPr lang="es-ES"/>
               <a:t>Cuarto nivel</a:t>
             </a:r>
           </a:p>
           <a:p>
             <a:pPr lvl="4"/>
             <a:r>
-              <a:rPr lang="es-ES" smtClean="0"/>
+              <a:rPr lang="es-ES"/>
               <a:t>Quinto nivel</a:t>
             </a:r>
             <a:endParaRPr lang="es-US"/>
@@ -458,7 +503,7 @@
           <a:p>
             <a:fld id="{72CBDC4D-2825-4B29-BDD6-C9A7F787A255}" type="datetimeFigureOut">
               <a:rPr lang="es-US" smtClean="0"/>
-              <a:t>7/19/2021</a:t>
+              <a:t>9/4/21</a:t>
             </a:fld>
             <a:endParaRPr lang="es-US"/>
           </a:p>
@@ -500,7 +545,7 @@
           <a:p>
             <a:fld id="{A6DE7BE1-8185-444A-AE5E-6A3DF189B9C2}" type="slidenum">
               <a:rPr lang="es-US" smtClean="0"/>
-              <a:t>‹Nº›</a:t>
+              <a:t>‹#›</a:t>
             </a:fld>
             <a:endParaRPr lang="es-US"/>
           </a:p>
@@ -557,7 +602,7 @@
           <a:lstStyle/>
           <a:p>
             <a:r>
-              <a:rPr lang="es-ES" smtClean="0"/>
+              <a:rPr lang="es-ES"/>
               <a:t>Haga clic para modificar el estilo de título del patrón</a:t>
             </a:r>
             <a:endParaRPr lang="es-US"/>
@@ -586,35 +631,35 @@
           <a:p>
             <a:pPr lvl="0"/>
             <a:r>
-              <a:rPr lang="es-ES" smtClean="0"/>
+              <a:rPr lang="es-ES"/>
               <a:t>Haga clic para modificar el estilo de texto del patrón</a:t>
             </a:r>
           </a:p>
           <a:p>
             <a:pPr lvl="1"/>
             <a:r>
-              <a:rPr lang="es-ES" smtClean="0"/>
+              <a:rPr lang="es-ES"/>
               <a:t>Segundo nivel</a:t>
             </a:r>
           </a:p>
           <a:p>
             <a:pPr lvl="2"/>
             <a:r>
-              <a:rPr lang="es-ES" smtClean="0"/>
+              <a:rPr lang="es-ES"/>
               <a:t>Tercer nivel</a:t>
             </a:r>
           </a:p>
           <a:p>
             <a:pPr lvl="3"/>
             <a:r>
-              <a:rPr lang="es-ES" smtClean="0"/>
+              <a:rPr lang="es-ES"/>
               <a:t>Cuarto nivel</a:t>
             </a:r>
           </a:p>
           <a:p>
             <a:pPr lvl="4"/>
             <a:r>
-              <a:rPr lang="es-ES" smtClean="0"/>
+              <a:rPr lang="es-ES"/>
               <a:t>Quinto nivel</a:t>
             </a:r>
             <a:endParaRPr lang="es-US"/>
@@ -638,7 +683,7 @@
           <a:p>
             <a:fld id="{72CBDC4D-2825-4B29-BDD6-C9A7F787A255}" type="datetimeFigureOut">
               <a:rPr lang="es-US" smtClean="0"/>
-              <a:t>7/19/2021</a:t>
+              <a:t>9/4/21</a:t>
             </a:fld>
             <a:endParaRPr lang="es-US"/>
           </a:p>
@@ -680,7 +725,7 @@
           <a:p>
             <a:fld id="{A6DE7BE1-8185-444A-AE5E-6A3DF189B9C2}" type="slidenum">
               <a:rPr lang="es-US" smtClean="0"/>
-              <a:t>‹Nº›</a:t>
+              <a:t>‹#›</a:t>
             </a:fld>
             <a:endParaRPr lang="es-US"/>
           </a:p>
@@ -732,7 +777,7 @@
           <a:lstStyle/>
           <a:p>
             <a:r>
-              <a:rPr lang="es-ES" smtClean="0"/>
+              <a:rPr lang="es-ES"/>
               <a:t>Haga clic para modificar el estilo de título del patrón</a:t>
             </a:r>
             <a:endParaRPr lang="es-US"/>
@@ -756,35 +801,35 @@
           <a:p>
             <a:pPr lvl="0"/>
             <a:r>
-              <a:rPr lang="es-ES" smtClean="0"/>
+              <a:rPr lang="es-ES"/>
               <a:t>Haga clic para modificar el estilo de texto del patrón</a:t>
             </a:r>
           </a:p>
           <a:p>
             <a:pPr lvl="1"/>
             <a:r>
-              <a:rPr lang="es-ES" smtClean="0"/>
+              <a:rPr lang="es-ES"/>
               <a:t>Segundo nivel</a:t>
             </a:r>
           </a:p>
           <a:p>
             <a:pPr lvl="2"/>
             <a:r>
-              <a:rPr lang="es-ES" smtClean="0"/>
+              <a:rPr lang="es-ES"/>
               <a:t>Tercer nivel</a:t>
             </a:r>
           </a:p>
           <a:p>
             <a:pPr lvl="3"/>
             <a:r>
-              <a:rPr lang="es-ES" smtClean="0"/>
+              <a:rPr lang="es-ES"/>
               <a:t>Cuarto nivel</a:t>
             </a:r>
           </a:p>
           <a:p>
             <a:pPr lvl="4"/>
             <a:r>
-              <a:rPr lang="es-ES" smtClean="0"/>
+              <a:rPr lang="es-ES"/>
               <a:t>Quinto nivel</a:t>
             </a:r>
             <a:endParaRPr lang="es-US"/>
@@ -808,7 +853,7 @@
           <a:p>
             <a:fld id="{72CBDC4D-2825-4B29-BDD6-C9A7F787A255}" type="datetimeFigureOut">
               <a:rPr lang="es-US" smtClean="0"/>
-              <a:t>7/19/2021</a:t>
+              <a:t>9/4/21</a:t>
             </a:fld>
             <a:endParaRPr lang="es-US"/>
           </a:p>
@@ -850,7 +895,7 @@
           <a:p>
             <a:fld id="{A6DE7BE1-8185-444A-AE5E-6A3DF189B9C2}" type="slidenum">
               <a:rPr lang="es-US" smtClean="0"/>
-              <a:t>‹Nº›</a:t>
+              <a:t>‹#›</a:t>
             </a:fld>
             <a:endParaRPr lang="es-US"/>
           </a:p>
@@ -911,7 +956,7 @@
           </a:lstStyle>
           <a:p>
             <a:r>
-              <a:rPr lang="es-ES" smtClean="0"/>
+              <a:rPr lang="es-ES"/>
               <a:t>Haga clic para modificar el estilo de título del patrón</a:t>
             </a:r>
             <a:endParaRPr lang="es-US"/>
@@ -1031,7 +1076,7 @@
           <a:p>
             <a:pPr lvl="0"/>
             <a:r>
-              <a:rPr lang="es-ES" smtClean="0"/>
+              <a:rPr lang="es-ES"/>
               <a:t>Haga clic para modificar el estilo de texto del patrón</a:t>
             </a:r>
           </a:p>
@@ -1054,7 +1099,7 @@
           <a:p>
             <a:fld id="{72CBDC4D-2825-4B29-BDD6-C9A7F787A255}" type="datetimeFigureOut">
               <a:rPr lang="es-US" smtClean="0"/>
-              <a:t>7/19/2021</a:t>
+              <a:t>9/4/21</a:t>
             </a:fld>
             <a:endParaRPr lang="es-US"/>
           </a:p>
@@ -1096,7 +1141,7 @@
           <a:p>
             <a:fld id="{A6DE7BE1-8185-444A-AE5E-6A3DF189B9C2}" type="slidenum">
               <a:rPr lang="es-US" smtClean="0"/>
-              <a:t>‹Nº›</a:t>
+              <a:t>‹#›</a:t>
             </a:fld>
             <a:endParaRPr lang="es-US"/>
           </a:p>
@@ -1148,7 +1193,7 @@
           <a:lstStyle/>
           <a:p>
             <a:r>
-              <a:rPr lang="es-ES" smtClean="0"/>
+              <a:rPr lang="es-ES"/>
               <a:t>Haga clic para modificar el estilo de título del patrón</a:t>
             </a:r>
             <a:endParaRPr lang="es-US"/>
@@ -1205,35 +1250,35 @@
           <a:p>
             <a:pPr lvl="0"/>
             <a:r>
-              <a:rPr lang="es-ES" smtClean="0"/>
+              <a:rPr lang="es-ES"/>
               <a:t>Haga clic para modificar el estilo de texto del patrón</a:t>
             </a:r>
           </a:p>
           <a:p>
             <a:pPr lvl="1"/>
             <a:r>
-              <a:rPr lang="es-ES" smtClean="0"/>
+              <a:rPr lang="es-ES"/>
               <a:t>Segundo nivel</a:t>
             </a:r>
           </a:p>
           <a:p>
             <a:pPr lvl="2"/>
             <a:r>
-              <a:rPr lang="es-ES" smtClean="0"/>
+              <a:rPr lang="es-ES"/>
               <a:t>Tercer nivel</a:t>
             </a:r>
           </a:p>
           <a:p>
             <a:pPr lvl="3"/>
             <a:r>
-              <a:rPr lang="es-ES" smtClean="0"/>
+              <a:rPr lang="es-ES"/>
               <a:t>Cuarto nivel</a:t>
             </a:r>
           </a:p>
           <a:p>
             <a:pPr lvl="4"/>
             <a:r>
-              <a:rPr lang="es-ES" smtClean="0"/>
+              <a:rPr lang="es-ES"/>
               <a:t>Quinto nivel</a:t>
             </a:r>
             <a:endParaRPr lang="es-US"/>
@@ -1290,35 +1335,35 @@
           <a:p>
             <a:pPr lvl="0"/>
             <a:r>
-              <a:rPr lang="es-ES" smtClean="0"/>
+              <a:rPr lang="es-ES"/>
               <a:t>Haga clic para modificar el estilo de texto del patrón</a:t>
             </a:r>
           </a:p>
           <a:p>
             <a:pPr lvl="1"/>
             <a:r>
-              <a:rPr lang="es-ES" smtClean="0"/>
+              <a:rPr lang="es-ES"/>
               <a:t>Segundo nivel</a:t>
             </a:r>
           </a:p>
           <a:p>
             <a:pPr lvl="2"/>
             <a:r>
-              <a:rPr lang="es-ES" smtClean="0"/>
+              <a:rPr lang="es-ES"/>
               <a:t>Tercer nivel</a:t>
             </a:r>
           </a:p>
           <a:p>
             <a:pPr lvl="3"/>
             <a:r>
-              <a:rPr lang="es-ES" smtClean="0"/>
+              <a:rPr lang="es-ES"/>
               <a:t>Cuarto nivel</a:t>
             </a:r>
           </a:p>
           <a:p>
             <a:pPr lvl="4"/>
             <a:r>
-              <a:rPr lang="es-ES" smtClean="0"/>
+              <a:rPr lang="es-ES"/>
               <a:t>Quinto nivel</a:t>
             </a:r>
             <a:endParaRPr lang="es-US"/>
@@ -1342,7 +1387,7 @@
           <a:p>
             <a:fld id="{72CBDC4D-2825-4B29-BDD6-C9A7F787A255}" type="datetimeFigureOut">
               <a:rPr lang="es-US" smtClean="0"/>
-              <a:t>7/19/2021</a:t>
+              <a:t>9/4/21</a:t>
             </a:fld>
             <a:endParaRPr lang="es-US"/>
           </a:p>
@@ -1384,7 +1429,7 @@
           <a:p>
             <a:fld id="{A6DE7BE1-8185-444A-AE5E-6A3DF189B9C2}" type="slidenum">
               <a:rPr lang="es-US" smtClean="0"/>
-              <a:t>‹Nº›</a:t>
+              <a:t>‹#›</a:t>
             </a:fld>
             <a:endParaRPr lang="es-US"/>
           </a:p>
@@ -1440,7 +1485,7 @@
           </a:lstStyle>
           <a:p>
             <a:r>
-              <a:rPr lang="es-ES" smtClean="0"/>
+              <a:rPr lang="es-ES"/>
               <a:t>Haga clic para modificar el estilo de título del patrón</a:t>
             </a:r>
             <a:endParaRPr lang="es-US"/>
@@ -1506,7 +1551,7 @@
           <a:p>
             <a:pPr lvl="0"/>
             <a:r>
-              <a:rPr lang="es-ES" smtClean="0"/>
+              <a:rPr lang="es-ES"/>
               <a:t>Haga clic para modificar el estilo de texto del patrón</a:t>
             </a:r>
           </a:p>
@@ -1562,35 +1607,35 @@
           <a:p>
             <a:pPr lvl="0"/>
             <a:r>
-              <a:rPr lang="es-ES" smtClean="0"/>
+              <a:rPr lang="es-ES"/>
               <a:t>Haga clic para modificar el estilo de texto del patrón</a:t>
             </a:r>
           </a:p>
           <a:p>
             <a:pPr lvl="1"/>
             <a:r>
-              <a:rPr lang="es-ES" smtClean="0"/>
+              <a:rPr lang="es-ES"/>
               <a:t>Segundo nivel</a:t>
             </a:r>
           </a:p>
           <a:p>
             <a:pPr lvl="2"/>
             <a:r>
-              <a:rPr lang="es-ES" smtClean="0"/>
+              <a:rPr lang="es-ES"/>
               <a:t>Tercer nivel</a:t>
             </a:r>
           </a:p>
           <a:p>
             <a:pPr lvl="3"/>
             <a:r>
-              <a:rPr lang="es-ES" smtClean="0"/>
+              <a:rPr lang="es-ES"/>
               <a:t>Cuarto nivel</a:t>
             </a:r>
           </a:p>
           <a:p>
             <a:pPr lvl="4"/>
             <a:r>
-              <a:rPr lang="es-ES" smtClean="0"/>
+              <a:rPr lang="es-ES"/>
               <a:t>Quinto nivel</a:t>
             </a:r>
             <a:endParaRPr lang="es-US"/>
@@ -1656,7 +1701,7 @@
           <a:p>
             <a:pPr lvl="0"/>
             <a:r>
-              <a:rPr lang="es-ES" smtClean="0"/>
+              <a:rPr lang="es-ES"/>
               <a:t>Haga clic para modificar el estilo de texto del patrón</a:t>
             </a:r>
           </a:p>
@@ -1712,35 +1757,35 @@
           <a:p>
             <a:pPr lvl="0"/>
             <a:r>
-              <a:rPr lang="es-ES" smtClean="0"/>
+              <a:rPr lang="es-ES"/>
               <a:t>Haga clic para modificar el estilo de texto del patrón</a:t>
             </a:r>
           </a:p>
           <a:p>
             <a:pPr lvl="1"/>
             <a:r>
-              <a:rPr lang="es-ES" smtClean="0"/>
+              <a:rPr lang="es-ES"/>
               <a:t>Segundo nivel</a:t>
             </a:r>
           </a:p>
           <a:p>
             <a:pPr lvl="2"/>
             <a:r>
-              <a:rPr lang="es-ES" smtClean="0"/>
+              <a:rPr lang="es-ES"/>
               <a:t>Tercer nivel</a:t>
             </a:r>
           </a:p>
           <a:p>
             <a:pPr lvl="3"/>
             <a:r>
-              <a:rPr lang="es-ES" smtClean="0"/>
+              <a:rPr lang="es-ES"/>
               <a:t>Cuarto nivel</a:t>
             </a:r>
           </a:p>
           <a:p>
             <a:pPr lvl="4"/>
             <a:r>
-              <a:rPr lang="es-ES" smtClean="0"/>
+              <a:rPr lang="es-ES"/>
               <a:t>Quinto nivel</a:t>
             </a:r>
             <a:endParaRPr lang="es-US"/>
@@ -1764,7 +1809,7 @@
           <a:p>
             <a:fld id="{72CBDC4D-2825-4B29-BDD6-C9A7F787A255}" type="datetimeFigureOut">
               <a:rPr lang="es-US" smtClean="0"/>
-              <a:t>7/19/2021</a:t>
+              <a:t>9/4/21</a:t>
             </a:fld>
             <a:endParaRPr lang="es-US"/>
           </a:p>
@@ -1806,7 +1851,7 @@
           <a:p>
             <a:fld id="{A6DE7BE1-8185-444A-AE5E-6A3DF189B9C2}" type="slidenum">
               <a:rPr lang="es-US" smtClean="0"/>
-              <a:t>‹Nº›</a:t>
+              <a:t>‹#›</a:t>
             </a:fld>
             <a:endParaRPr lang="es-US"/>
           </a:p>
@@ -1858,7 +1903,7 @@
           <a:lstStyle/>
           <a:p>
             <a:r>
-              <a:rPr lang="es-ES" smtClean="0"/>
+              <a:rPr lang="es-ES"/>
               <a:t>Haga clic para modificar el estilo de título del patrón</a:t>
             </a:r>
             <a:endParaRPr lang="es-US"/>
@@ -1882,7 +1927,7 @@
           <a:p>
             <a:fld id="{72CBDC4D-2825-4B29-BDD6-C9A7F787A255}" type="datetimeFigureOut">
               <a:rPr lang="es-US" smtClean="0"/>
-              <a:t>7/19/2021</a:t>
+              <a:t>9/4/21</a:t>
             </a:fld>
             <a:endParaRPr lang="es-US"/>
           </a:p>
@@ -1924,7 +1969,7 @@
           <a:p>
             <a:fld id="{A6DE7BE1-8185-444A-AE5E-6A3DF189B9C2}" type="slidenum">
               <a:rPr lang="es-US" smtClean="0"/>
-              <a:t>‹Nº›</a:t>
+              <a:t>‹#›</a:t>
             </a:fld>
             <a:endParaRPr lang="es-US"/>
           </a:p>
@@ -1977,7 +2022,7 @@
           <a:p>
             <a:fld id="{72CBDC4D-2825-4B29-BDD6-C9A7F787A255}" type="datetimeFigureOut">
               <a:rPr lang="es-US" smtClean="0"/>
-              <a:t>7/19/2021</a:t>
+              <a:t>9/4/21</a:t>
             </a:fld>
             <a:endParaRPr lang="es-US"/>
           </a:p>
@@ -2019,7 +2064,7 @@
           <a:p>
             <a:fld id="{A6DE7BE1-8185-444A-AE5E-6A3DF189B9C2}" type="slidenum">
               <a:rPr lang="es-US" smtClean="0"/>
-              <a:t>‹Nº›</a:t>
+              <a:t>‹#›</a:t>
             </a:fld>
             <a:endParaRPr lang="es-US"/>
           </a:p>
@@ -2080,7 +2125,7 @@
           </a:lstStyle>
           <a:p>
             <a:r>
-              <a:rPr lang="es-ES" smtClean="0"/>
+              <a:rPr lang="es-ES"/>
               <a:t>Haga clic para modificar el estilo de título del patrón</a:t>
             </a:r>
             <a:endParaRPr lang="es-US"/>
@@ -2137,35 +2182,35 @@
           <a:p>
             <a:pPr lvl="0"/>
             <a:r>
-              <a:rPr lang="es-ES" smtClean="0"/>
+              <a:rPr lang="es-ES"/>
               <a:t>Haga clic para modificar el estilo de texto del patrón</a:t>
             </a:r>
           </a:p>
           <a:p>
             <a:pPr lvl="1"/>
             <a:r>
-              <a:rPr lang="es-ES" smtClean="0"/>
+              <a:rPr lang="es-ES"/>
               <a:t>Segundo nivel</a:t>
             </a:r>
           </a:p>
           <a:p>
             <a:pPr lvl="2"/>
             <a:r>
-              <a:rPr lang="es-ES" smtClean="0"/>
+              <a:rPr lang="es-ES"/>
               <a:t>Tercer nivel</a:t>
             </a:r>
           </a:p>
           <a:p>
             <a:pPr lvl="3"/>
             <a:r>
-              <a:rPr lang="es-ES" smtClean="0"/>
+              <a:rPr lang="es-ES"/>
               <a:t>Cuarto nivel</a:t>
             </a:r>
           </a:p>
           <a:p>
             <a:pPr lvl="4"/>
             <a:r>
-              <a:rPr lang="es-ES" smtClean="0"/>
+              <a:rPr lang="es-ES"/>
               <a:t>Quinto nivel</a:t>
             </a:r>
             <a:endParaRPr lang="es-US"/>
@@ -2231,7 +2276,7 @@
           <a:p>
             <a:pPr lvl="0"/>
             <a:r>
-              <a:rPr lang="es-ES" smtClean="0"/>
+              <a:rPr lang="es-ES"/>
               <a:t>Haga clic para modificar el estilo de texto del patrón</a:t>
             </a:r>
           </a:p>
@@ -2254,7 +2299,7 @@
           <a:p>
             <a:fld id="{72CBDC4D-2825-4B29-BDD6-C9A7F787A255}" type="datetimeFigureOut">
               <a:rPr lang="es-US" smtClean="0"/>
-              <a:t>7/19/2021</a:t>
+              <a:t>9/4/21</a:t>
             </a:fld>
             <a:endParaRPr lang="es-US"/>
           </a:p>
@@ -2296,7 +2341,7 @@
           <a:p>
             <a:fld id="{A6DE7BE1-8185-444A-AE5E-6A3DF189B9C2}" type="slidenum">
               <a:rPr lang="es-US" smtClean="0"/>
-              <a:t>‹Nº›</a:t>
+              <a:t>‹#›</a:t>
             </a:fld>
             <a:endParaRPr lang="es-US"/>
           </a:p>
@@ -2357,7 +2402,7 @@
           </a:lstStyle>
           <a:p>
             <a:r>
-              <a:rPr lang="es-ES" smtClean="0"/>
+              <a:rPr lang="es-ES"/>
               <a:t>Haga clic para modificar el estilo de título del patrón</a:t>
             </a:r>
             <a:endParaRPr lang="es-US"/>
@@ -2484,7 +2529,7 @@
           <a:p>
             <a:pPr lvl="0"/>
             <a:r>
-              <a:rPr lang="es-ES" smtClean="0"/>
+              <a:rPr lang="es-ES"/>
               <a:t>Haga clic para modificar el estilo de texto del patrón</a:t>
             </a:r>
           </a:p>
@@ -2507,7 +2552,7 @@
           <a:p>
             <a:fld id="{72CBDC4D-2825-4B29-BDD6-C9A7F787A255}" type="datetimeFigureOut">
               <a:rPr lang="es-US" smtClean="0"/>
-              <a:t>7/19/2021</a:t>
+              <a:t>9/4/21</a:t>
             </a:fld>
             <a:endParaRPr lang="es-US"/>
           </a:p>
@@ -2549,7 +2594,7 @@
           <a:p>
             <a:fld id="{A6DE7BE1-8185-444A-AE5E-6A3DF189B9C2}" type="slidenum">
               <a:rPr lang="es-US" smtClean="0"/>
-              <a:t>‹Nº›</a:t>
+              <a:t>‹#›</a:t>
             </a:fld>
             <a:endParaRPr lang="es-US"/>
           </a:p>
@@ -2616,7 +2661,7 @@
           <a:lstStyle/>
           <a:p>
             <a:r>
-              <a:rPr lang="es-ES" smtClean="0"/>
+              <a:rPr lang="es-ES"/>
               <a:t>Haga clic para modificar el estilo de título del patrón</a:t>
             </a:r>
             <a:endParaRPr lang="es-US"/>
@@ -2650,35 +2695,35 @@
           <a:p>
             <a:pPr lvl="0"/>
             <a:r>
-              <a:rPr lang="es-ES" smtClean="0"/>
+              <a:rPr lang="es-ES"/>
               <a:t>Haga clic para modificar el estilo de texto del patrón</a:t>
             </a:r>
           </a:p>
           <a:p>
             <a:pPr lvl="1"/>
             <a:r>
-              <a:rPr lang="es-ES" smtClean="0"/>
+              <a:rPr lang="es-ES"/>
               <a:t>Segundo nivel</a:t>
             </a:r>
           </a:p>
           <a:p>
             <a:pPr lvl="2"/>
             <a:r>
-              <a:rPr lang="es-ES" smtClean="0"/>
+              <a:rPr lang="es-ES"/>
               <a:t>Tercer nivel</a:t>
             </a:r>
           </a:p>
           <a:p>
             <a:pPr lvl="3"/>
             <a:r>
-              <a:rPr lang="es-ES" smtClean="0"/>
+              <a:rPr lang="es-ES"/>
               <a:t>Cuarto nivel</a:t>
             </a:r>
           </a:p>
           <a:p>
             <a:pPr lvl="4"/>
             <a:r>
-              <a:rPr lang="es-ES" smtClean="0"/>
+              <a:rPr lang="es-ES"/>
               <a:t>Quinto nivel</a:t>
             </a:r>
             <a:endParaRPr lang="es-US"/>
@@ -2720,7 +2765,7 @@
           <a:p>
             <a:fld id="{72CBDC4D-2825-4B29-BDD6-C9A7F787A255}" type="datetimeFigureOut">
               <a:rPr lang="es-US" smtClean="0"/>
-              <a:t>7/19/2021</a:t>
+              <a:t>9/4/21</a:t>
             </a:fld>
             <a:endParaRPr lang="es-US"/>
           </a:p>
@@ -2798,7 +2843,7 @@
           <a:p>
             <a:fld id="{A6DE7BE1-8185-444A-AE5E-6A3DF189B9C2}" type="slidenum">
               <a:rPr lang="es-US" smtClean="0"/>
-              <a:t>‹Nº›</a:t>
+              <a:t>‹#›</a:t>
             </a:fld>
             <a:endParaRPr lang="es-US"/>
           </a:p>
@@ -3118,10 +3163,9 @@
           <a:lstStyle/>
           <a:p>
             <a:r>
-              <a:rPr lang="es-US" sz="1600" b="1" dirty="0" smtClean="0"/>
+              <a:rPr lang="es-US" sz="1600" b="1" dirty="0"/>
               <a:t>Equipos a requerir</a:t>
             </a:r>
-            <a:endParaRPr lang="es-US" sz="1600" b="1" dirty="0"/>
           </a:p>
         </p:txBody>
       </p:sp>
@@ -3152,10 +3196,9 @@
               <a:buChar char="•"/>
             </a:pPr>
             <a:r>
-              <a:rPr lang="es-US" sz="1600" dirty="0" smtClean="0"/>
+              <a:rPr lang="es-US" sz="1600" dirty="0"/>
               <a:t>Termostato regulable con medidor de temperatura y humedad</a:t>
             </a:r>
-            <a:endParaRPr lang="es-US" sz="1600" dirty="0"/>
           </a:p>
         </p:txBody>
       </p:sp>
@@ -3227,18 +3270,9 @@
               <a:buChar char="•"/>
             </a:pPr>
             <a:r>
-              <a:rPr lang="es-US" sz="1600" dirty="0" smtClean="0"/>
-              <a:t>Bombillo </a:t>
-            </a:r>
-            <a:r>
-              <a:rPr lang="es-US" sz="1600" dirty="0" err="1" smtClean="0"/>
-              <a:t>terrarium</a:t>
-            </a:r>
-            <a:r>
-              <a:rPr lang="es-US" sz="1600" dirty="0" smtClean="0"/>
-              <a:t> y socket</a:t>
-            </a:r>
-            <a:endParaRPr lang="es-US" sz="1600" dirty="0"/>
+              <a:rPr lang="es-US" sz="1600" dirty="0"/>
+              <a:t>Bombillo terrario y socket</a:t>
+            </a:r>
           </a:p>
         </p:txBody>
       </p:sp>

</xml_diff>